<commit_message>
Added sorted complete animation
</commit_message>
<xml_diff>
--- a/5 - Sorting Algorithms/Bubble Sort.pptx
+++ b/5 - Sorting Algorithms/Bubble Sort.pptx
@@ -222,7 +222,7 @@
           <a:p>
             <a:fld id="{F666E1FD-E7A0-497B-BBC0-740BAAC97C64}" type="datetimeFigureOut">
               <a:rPr lang="en-PH" smtClean="0"/>
-              <a:t>10/09/2023</a:t>
+              <a:t>9/11/23</a:t>
             </a:fld>
             <a:endParaRPr lang="en-PH"/>
           </a:p>
@@ -2151,7 +2151,7 @@
           <a:p>
             <a:fld id="{0CCF0B81-6BD8-4C65-9459-815598C5F1F4}" type="datetimeFigureOut">
               <a:rPr lang="en-PH" smtClean="0"/>
-              <a:t>10/09/2023</a:t>
+              <a:t>9/11/23</a:t>
             </a:fld>
             <a:endParaRPr lang="en-PH"/>
           </a:p>
@@ -2351,7 +2351,7 @@
           <a:p>
             <a:fld id="{0CCF0B81-6BD8-4C65-9459-815598C5F1F4}" type="datetimeFigureOut">
               <a:rPr lang="en-PH" smtClean="0"/>
-              <a:t>10/09/2023</a:t>
+              <a:t>9/11/23</a:t>
             </a:fld>
             <a:endParaRPr lang="en-PH"/>
           </a:p>
@@ -2561,7 +2561,7 @@
           <a:p>
             <a:fld id="{0CCF0B81-6BD8-4C65-9459-815598C5F1F4}" type="datetimeFigureOut">
               <a:rPr lang="en-PH" smtClean="0"/>
-              <a:t>10/09/2023</a:t>
+              <a:t>9/11/23</a:t>
             </a:fld>
             <a:endParaRPr lang="en-PH"/>
           </a:p>
@@ -2761,7 +2761,7 @@
           <a:p>
             <a:fld id="{0CCF0B81-6BD8-4C65-9459-815598C5F1F4}" type="datetimeFigureOut">
               <a:rPr lang="en-PH" smtClean="0"/>
-              <a:t>10/09/2023</a:t>
+              <a:t>9/11/23</a:t>
             </a:fld>
             <a:endParaRPr lang="en-PH"/>
           </a:p>
@@ -3037,7 +3037,7 @@
           <a:p>
             <a:fld id="{0CCF0B81-6BD8-4C65-9459-815598C5F1F4}" type="datetimeFigureOut">
               <a:rPr lang="en-PH" smtClean="0"/>
-              <a:t>10/09/2023</a:t>
+              <a:t>9/11/23</a:t>
             </a:fld>
             <a:endParaRPr lang="en-PH"/>
           </a:p>
@@ -3305,7 +3305,7 @@
           <a:p>
             <a:fld id="{0CCF0B81-6BD8-4C65-9459-815598C5F1F4}" type="datetimeFigureOut">
               <a:rPr lang="en-PH" smtClean="0"/>
-              <a:t>10/09/2023</a:t>
+              <a:t>9/11/23</a:t>
             </a:fld>
             <a:endParaRPr lang="en-PH"/>
           </a:p>
@@ -3720,7 +3720,7 @@
           <a:p>
             <a:fld id="{0CCF0B81-6BD8-4C65-9459-815598C5F1F4}" type="datetimeFigureOut">
               <a:rPr lang="en-PH" smtClean="0"/>
-              <a:t>10/09/2023</a:t>
+              <a:t>9/11/23</a:t>
             </a:fld>
             <a:endParaRPr lang="en-PH"/>
           </a:p>
@@ -3862,7 +3862,7 @@
           <a:p>
             <a:fld id="{0CCF0B81-6BD8-4C65-9459-815598C5F1F4}" type="datetimeFigureOut">
               <a:rPr lang="en-PH" smtClean="0"/>
-              <a:t>10/09/2023</a:t>
+              <a:t>9/11/23</a:t>
             </a:fld>
             <a:endParaRPr lang="en-PH"/>
           </a:p>
@@ -3975,7 +3975,7 @@
           <a:p>
             <a:fld id="{0CCF0B81-6BD8-4C65-9459-815598C5F1F4}" type="datetimeFigureOut">
               <a:rPr lang="en-PH" smtClean="0"/>
-              <a:t>10/09/2023</a:t>
+              <a:t>9/11/23</a:t>
             </a:fld>
             <a:endParaRPr lang="en-PH"/>
           </a:p>
@@ -4288,7 +4288,7 @@
           <a:p>
             <a:fld id="{0CCF0B81-6BD8-4C65-9459-815598C5F1F4}" type="datetimeFigureOut">
               <a:rPr lang="en-PH" smtClean="0"/>
-              <a:t>10/09/2023</a:t>
+              <a:t>9/11/23</a:t>
             </a:fld>
             <a:endParaRPr lang="en-PH"/>
           </a:p>
@@ -4577,7 +4577,7 @@
           <a:p>
             <a:fld id="{0CCF0B81-6BD8-4C65-9459-815598C5F1F4}" type="datetimeFigureOut">
               <a:rPr lang="en-PH" smtClean="0"/>
-              <a:t>10/09/2023</a:t>
+              <a:t>9/11/23</a:t>
             </a:fld>
             <a:endParaRPr lang="en-PH"/>
           </a:p>
@@ -4820,7 +4820,7 @@
           <a:p>
             <a:fld id="{0CCF0B81-6BD8-4C65-9459-815598C5F1F4}" type="datetimeFigureOut">
               <a:rPr lang="en-PH" smtClean="0"/>
-              <a:t>10/09/2023</a:t>
+              <a:t>9/11/23</a:t>
             </a:fld>
             <a:endParaRPr lang="en-PH"/>
           </a:p>
@@ -9695,37 +9695,49 @@
       </p:sp>
       <p:sp>
         <p:nvSpPr>
-          <p:cNvPr id="5" name="TextBox 4">
-            <a:extLst>
-              <a:ext uri="{FF2B5EF4-FFF2-40B4-BE49-F238E27FC236}">
-                <a16:creationId xmlns:a16="http://schemas.microsoft.com/office/drawing/2014/main" id="{29F2A501-2BA3-BEFB-5977-D95D3CB6DE77}"/>
-              </a:ext>
-            </a:extLst>
-          </p:cNvPr>
-          <p:cNvSpPr txBox="1"/>
+          <p:cNvPr id="6" name="7-Point Star 5">
+            <a:extLst>
+              <a:ext uri="{FF2B5EF4-FFF2-40B4-BE49-F238E27FC236}">
+                <a16:creationId xmlns:a16="http://schemas.microsoft.com/office/drawing/2014/main" id="{7B711264-F607-B832-860B-CC5E365DAD85}"/>
+              </a:ext>
+            </a:extLst>
+          </p:cNvPr>
+          <p:cNvSpPr/>
           <p:nvPr/>
         </p:nvSpPr>
         <p:spPr>
           <a:xfrm>
-            <a:off x="4058172" y="3973213"/>
-            <a:ext cx="3672475" cy="707886"/>
+            <a:off x="4160174" y="3926149"/>
+            <a:ext cx="3080423" cy="1905831"/>
           </a:xfrm>
-          <a:prstGeom prst="rect">
+          <a:prstGeom prst="star7">
             <a:avLst/>
           </a:prstGeom>
-          <a:noFill/>
         </p:spPr>
-        <p:txBody>
-          <a:bodyPr wrap="square" rtlCol="0">
-            <a:spAutoFit/>
-          </a:bodyPr>
-          <a:lstStyle/>
-          <a:p>
-            <a:r>
-              <a:rPr lang="en-US" sz="4000" dirty="0"/>
+        <p:style>
+          <a:lnRef idx="1">
+            <a:schemeClr val="accent4"/>
+          </a:lnRef>
+          <a:fillRef idx="3">
+            <a:schemeClr val="accent4"/>
+          </a:fillRef>
+          <a:effectRef idx="2">
+            <a:schemeClr val="accent4"/>
+          </a:effectRef>
+          <a:fontRef idx="minor">
+            <a:schemeClr val="lt1"/>
+          </a:fontRef>
+        </p:style>
+        <p:txBody>
+          <a:bodyPr rtlCol="0" anchor="ctr"/>
+          <a:lstStyle/>
+          <a:p>
+            <a:pPr algn="ctr"/>
+            <a:r>
+              <a:rPr lang="en-US" sz="3000" dirty="0"/>
               <a:t>Sorting Finished!</a:t>
             </a:r>
-            <a:endParaRPr lang="en-PH" sz="4000" dirty="0"/>
+            <a:endParaRPr lang="en-PH" sz="3000" dirty="0"/>
           </a:p>
         </p:txBody>
       </p:sp>
@@ -9760,7 +9772,7 @@
                             </p:stCondLst>
                             <p:childTnLst>
                               <p:par>
-                                <p:cTn id="5" presetID="53" presetClass="entr" presetSubtype="16" fill="hold" nodeType="clickEffect">
+                                <p:cTn id="5" presetID="53" presetClass="entr" presetSubtype="16" fill="hold" grpId="0" nodeType="clickEffect">
                                   <p:stCondLst>
                                     <p:cond delay="0"/>
                                   </p:stCondLst>
@@ -9773,11 +9785,7 @@
                                           </p:stCondLst>
                                         </p:cTn>
                                         <p:tgtEl>
-                                          <p:spTgt spid="5">
-                                            <p:txEl>
-                                              <p:pRg st="0" end="0"/>
-                                            </p:txEl>
-                                          </p:spTgt>
+                                          <p:spTgt spid="6"/>
                                         </p:tgtEl>
                                         <p:attrNameLst>
                                           <p:attrName>style.visibility</p:attrName>
@@ -9791,11 +9799,7 @@
                                       <p:cBhvr>
                                         <p:cTn id="7" dur="500" fill="hold"/>
                                         <p:tgtEl>
-                                          <p:spTgt spid="5">
-                                            <p:txEl>
-                                              <p:pRg st="0" end="0"/>
-                                            </p:txEl>
-                                          </p:spTgt>
+                                          <p:spTgt spid="6"/>
                                         </p:tgtEl>
                                         <p:attrNameLst>
                                           <p:attrName>ppt_w</p:attrName>
@@ -9818,11 +9822,7 @@
                                       <p:cBhvr>
                                         <p:cTn id="8" dur="500" fill="hold"/>
                                         <p:tgtEl>
-                                          <p:spTgt spid="5">
-                                            <p:txEl>
-                                              <p:pRg st="0" end="0"/>
-                                            </p:txEl>
-                                          </p:spTgt>
+                                          <p:spTgt spid="6"/>
                                         </p:tgtEl>
                                         <p:attrNameLst>
                                           <p:attrName>ppt_h</p:attrName>
@@ -9845,11 +9845,7 @@
                                       <p:cBhvr>
                                         <p:cTn id="9" dur="500"/>
                                         <p:tgtEl>
-                                          <p:spTgt spid="5">
-                                            <p:txEl>
-                                              <p:pRg st="0" end="0"/>
-                                            </p:txEl>
-                                          </p:spTgt>
+                                          <p:spTgt spid="6"/>
                                         </p:tgtEl>
                                       </p:cBhvr>
                                     </p:animEffect>
@@ -9883,6 +9879,9 @@
         </p:cTn>
       </p:par>
     </p:tnLst>
+    <p:bldLst>
+      <p:bldP spid="6" grpId="0" animBg="1"/>
+    </p:bldLst>
   </p:timing>
 </p:sld>
 </file>
@@ -14392,12 +14391,6 @@
 </file>
 
 <file path=customXml/item1.xml><?xml version="1.0" encoding="utf-8"?>
-<p:properties xmlns:p="http://schemas.microsoft.com/office/2006/metadata/properties" xmlns:xsi="http://www.w3.org/2001/XMLSchema-instance" xmlns:pc="http://schemas.microsoft.com/office/infopath/2007/PartnerControls">
-  <documentManagement/>
-</p:properties>
-</file>
-
-<file path=customXml/item2.xml><?xml version="1.0" encoding="utf-8"?>
 <ct:contentTypeSchema xmlns:ct="http://schemas.microsoft.com/office/2006/metadata/contentType" xmlns:ma="http://schemas.microsoft.com/office/2006/metadata/properties/metaAttributes" ct:_="" ma:_="" ma:contentTypeName="Document" ma:contentTypeID="0x0101007188BDCA587B344BBA6CB1A93FAE6998" ma:contentTypeVersion="2" ma:contentTypeDescription="Create a new document." ma:contentTypeScope="" ma:versionID="7a8e4b6720badb2566a0cfeddfaf2856">
   <xsd:schema xmlns:xsd="http://www.w3.org/2001/XMLSchema" xmlns:xs="http://www.w3.org/2001/XMLSchema" xmlns:p="http://schemas.microsoft.com/office/2006/metadata/properties" xmlns:ns2="ba111d12-426d-4af0-bcb6-460e36974645" targetNamespace="http://schemas.microsoft.com/office/2006/metadata/properties" ma:root="true" ma:fieldsID="989b05398519136c88ba0a8d54e3c3da" ns2:_="">
     <xsd:import namespace="ba111d12-426d-4af0-bcb6-460e36974645"/>
@@ -14529,6 +14522,12 @@
 </ct:contentTypeSchema>
 </file>
 
+<file path=customXml/item2.xml><?xml version="1.0" encoding="utf-8"?>
+<p:properties xmlns:p="http://schemas.microsoft.com/office/2006/metadata/properties" xmlns:xsi="http://www.w3.org/2001/XMLSchema-instance" xmlns:pc="http://schemas.microsoft.com/office/infopath/2007/PartnerControls">
+  <documentManagement/>
+</p:properties>
+</file>
+
 <file path=customXml/item3.xml><?xml version="1.0" encoding="utf-8"?>
 <?mso-contentType ?>
 <FormTemplates xmlns="http://schemas.microsoft.com/sharepoint/v3/contenttype/forms">
@@ -14539,15 +14538,6 @@
 </file>
 
 <file path=customXml/itemProps1.xml><?xml version="1.0" encoding="utf-8"?>
-<ds:datastoreItem xmlns:ds="http://schemas.openxmlformats.org/officeDocument/2006/customXml" ds:itemID="{EA3362E2-FA54-4262-AE94-2FA98FF8142D}">
-  <ds:schemaRefs>
-    <ds:schemaRef ds:uri="http://schemas.microsoft.com/office/2006/metadata/properties"/>
-    <ds:schemaRef ds:uri="http://schemas.microsoft.com/office/infopath/2007/PartnerControls"/>
-  </ds:schemaRefs>
-</ds:datastoreItem>
-</file>
-
-<file path=customXml/itemProps2.xml><?xml version="1.0" encoding="utf-8"?>
 <ds:datastoreItem xmlns:ds="http://schemas.openxmlformats.org/officeDocument/2006/customXml" ds:itemID="{3D61E20B-708A-4719-8C02-DA91A478A7AB}">
   <ds:schemaRefs>
     <ds:schemaRef ds:uri="http://schemas.microsoft.com/office/2006/metadata/contentType"/>
@@ -14565,6 +14555,15 @@
 </ds:datastoreItem>
 </file>
 
+<file path=customXml/itemProps2.xml><?xml version="1.0" encoding="utf-8"?>
+<ds:datastoreItem xmlns:ds="http://schemas.openxmlformats.org/officeDocument/2006/customXml" ds:itemID="{EA3362E2-FA54-4262-AE94-2FA98FF8142D}">
+  <ds:schemaRefs>
+    <ds:schemaRef ds:uri="http://schemas.microsoft.com/office/2006/metadata/properties"/>
+    <ds:schemaRef ds:uri="http://schemas.microsoft.com/office/infopath/2007/PartnerControls"/>
+  </ds:schemaRefs>
+</ds:datastoreItem>
+</file>
+
 <file path=customXml/itemProps3.xml><?xml version="1.0" encoding="utf-8"?>
 <ds:datastoreItem xmlns:ds="http://schemas.openxmlformats.org/officeDocument/2006/customXml" ds:itemID="{651370AF-26B9-4AFA-BA9D-5D4A7E1A6722}">
   <ds:schemaRefs>

</xml_diff>